<commit_message>
Backup: Wed Jan 29 10:45:22 IST 2025
</commit_message>
<xml_diff>
--- a/Python Presentation.pptx
+++ b/Python Presentation.pptx
@@ -117,6 +117,11 @@
       </a:defRPr>
     </a:lvl9pPr>
   </p:defaultTextStyle>
+  <p:extLst>
+    <p:ext uri="{EFAFB233-063F-42B5-8137-9DF3F51BA10A}">
+      <p15:sldGuideLst xmlns:p15="http://schemas.microsoft.com/office/powerpoint/2012/main"/>
+    </p:ext>
+  </p:extLst>
 </p:presentation>
 </file>
 
@@ -259,7 +264,7 @@
           <a:p>
             <a:fld id="{48A87A34-81AB-432B-8DAE-1953F412C126}" type="datetimeFigureOut">
               <a:rPr lang="en-US" dirty="0"/>
-              <a:t>1/23/25</a:t>
+              <a:t>1/29/25</a:t>
             </a:fld>
             <a:endParaRPr lang="en-US" dirty="0"/>
           </a:p>
@@ -465,7 +470,7 @@
           <a:p>
             <a:fld id="{48A87A34-81AB-432B-8DAE-1953F412C126}" type="datetimeFigureOut">
               <a:rPr lang="en-US" dirty="0"/>
-              <a:t>1/23/25</a:t>
+              <a:t>1/29/25</a:t>
             </a:fld>
             <a:endParaRPr lang="en-US" dirty="0"/>
           </a:p>
@@ -675,7 +680,7 @@
           <a:p>
             <a:fld id="{48A87A34-81AB-432B-8DAE-1953F412C126}" type="datetimeFigureOut">
               <a:rPr lang="en-US" dirty="0"/>
-              <a:t>1/23/25</a:t>
+              <a:t>1/29/25</a:t>
             </a:fld>
             <a:endParaRPr lang="en-US" dirty="0"/>
           </a:p>
@@ -871,7 +876,7 @@
           <a:p>
             <a:fld id="{48A87A34-81AB-432B-8DAE-1953F412C126}" type="datetimeFigureOut">
               <a:rPr lang="en-US" dirty="0"/>
-              <a:t>1/23/25</a:t>
+              <a:t>1/29/25</a:t>
             </a:fld>
             <a:endParaRPr lang="en-US" dirty="0"/>
           </a:p>
@@ -1145,7 +1150,7 @@
           <a:p>
             <a:fld id="{48A87A34-81AB-432B-8DAE-1953F412C126}" type="datetimeFigureOut">
               <a:rPr lang="en-US" dirty="0"/>
-              <a:t>1/23/25</a:t>
+              <a:t>1/29/25</a:t>
             </a:fld>
             <a:endParaRPr lang="en-US" dirty="0"/>
           </a:p>
@@ -1408,7 +1413,7 @@
           <a:p>
             <a:fld id="{48A87A34-81AB-432B-8DAE-1953F412C126}" type="datetimeFigureOut">
               <a:rPr lang="en-US" dirty="0"/>
-              <a:t>1/23/25</a:t>
+              <a:t>1/29/25</a:t>
             </a:fld>
             <a:endParaRPr lang="en-US" dirty="0"/>
           </a:p>
@@ -1819,7 +1824,7 @@
           <a:p>
             <a:fld id="{48A87A34-81AB-432B-8DAE-1953F412C126}" type="datetimeFigureOut">
               <a:rPr lang="en-US" dirty="0"/>
-              <a:t>1/23/25</a:t>
+              <a:t>1/29/25</a:t>
             </a:fld>
             <a:endParaRPr lang="en-US" dirty="0"/>
           </a:p>
@@ -1963,7 +1968,7 @@
           <a:p>
             <a:fld id="{48A87A34-81AB-432B-8DAE-1953F412C126}" type="datetimeFigureOut">
               <a:rPr lang="en-US" dirty="0"/>
-              <a:t>1/23/25</a:t>
+              <a:t>1/29/25</a:t>
             </a:fld>
             <a:endParaRPr lang="en-US" dirty="0"/>
           </a:p>
@@ -2084,7 +2089,7 @@
           <a:p>
             <a:fld id="{48A87A34-81AB-432B-8DAE-1953F412C126}" type="datetimeFigureOut">
               <a:rPr lang="en-US" dirty="0"/>
-              <a:t>1/23/25</a:t>
+              <a:t>1/29/25</a:t>
             </a:fld>
             <a:endParaRPr lang="en-US" dirty="0"/>
           </a:p>
@@ -2330,7 +2335,7 @@
           <a:p>
             <a:fld id="{48A87A34-81AB-432B-8DAE-1953F412C126}" type="datetimeFigureOut">
               <a:rPr lang="en-US" dirty="0"/>
-              <a:t>1/23/25</a:t>
+              <a:t>1/29/25</a:t>
             </a:fld>
             <a:endParaRPr lang="en-US" dirty="0"/>
           </a:p>
@@ -2771,7 +2776,7 @@
             <a:fld id="{48A87A34-81AB-432B-8DAE-1953F412C126}" type="datetimeFigureOut">
               <a:rPr lang="en-US" dirty="0"/>
               <a:pPr/>
-              <a:t>1/23/25</a:t>
+              <a:t>1/29/25</a:t>
             </a:fld>
             <a:endParaRPr lang="en-US" dirty="0"/>
           </a:p>
@@ -3094,7 +3099,7 @@
             <a:fld id="{48A87A34-81AB-432B-8DAE-1953F412C126}" type="datetimeFigureOut">
               <a:rPr lang="en-US" dirty="0"/>
               <a:pPr/>
-              <a:t>1/23/25</a:t>
+              <a:t>1/29/25</a:t>
             </a:fld>
             <a:endParaRPr lang="en-US" dirty="0"/>
           </a:p>
@@ -5731,35 +5736,50 @@
             </a:lvl9pPr>
           </a:lstStyle>
           <a:p>
-            <a:pPr marL="457200"/>
+            <a:pPr marL="685800" indent="-457200">
+              <a:buFont typeface="+mj-lt"/>
+              <a:buAutoNum type="arabicPeriod"/>
+            </a:pPr>
             <a:r>
               <a:rPr lang="en-US" dirty="0"/>
               <a:t>Data Sourcing</a:t>
             </a:r>
           </a:p>
           <a:p>
-            <a:pPr marL="457200"/>
+            <a:pPr marL="685800" indent="-457200">
+              <a:buFont typeface="+mj-lt"/>
+              <a:buAutoNum type="arabicPeriod"/>
+            </a:pPr>
             <a:r>
               <a:rPr lang="en-US" dirty="0"/>
               <a:t>MRI Preprocessing</a:t>
             </a:r>
           </a:p>
           <a:p>
-            <a:pPr marL="457200"/>
+            <a:pPr marL="685800" indent="-457200">
+              <a:buFont typeface="+mj-lt"/>
+              <a:buAutoNum type="arabicPeriod"/>
+            </a:pPr>
             <a:r>
               <a:rPr lang="en-US" dirty="0"/>
               <a:t>Matching MRI to template</a:t>
             </a:r>
           </a:p>
           <a:p>
-            <a:pPr marL="457200"/>
+            <a:pPr marL="685800" indent="-457200">
+              <a:buFont typeface="+mj-lt"/>
+              <a:buAutoNum type="arabicPeriod"/>
+            </a:pPr>
             <a:r>
               <a:rPr lang="en-US" dirty="0"/>
               <a:t>Region &amp; Volume Analysis</a:t>
             </a:r>
           </a:p>
           <a:p>
-            <a:pPr marL="457200"/>
+            <a:pPr marL="685800" indent="-457200">
+              <a:buFont typeface="+mj-lt"/>
+              <a:buAutoNum type="arabicPeriod"/>
+            </a:pPr>
             <a:r>
               <a:rPr lang="en-US" dirty="0"/>
               <a:t>Statistical Analysis</a:t>
@@ -5843,24 +5863,70 @@
         </p:nvSpPr>
         <p:spPr/>
         <p:txBody>
-          <a:bodyPr/>
-          <a:lstStyle/>
+          <a:bodyPr>
+            <a:normAutofit/>
+          </a:bodyPr>
+          <a:lstStyle/>
+          <a:p>
+            <a:pPr marL="0" indent="0">
+              <a:buNone/>
+            </a:pPr>
+            <a:r>
+              <a:rPr lang="en-US" u="sng" dirty="0"/>
+              <a:t>MRI Libraries</a:t>
+            </a:r>
+          </a:p>
           <a:p>
             <a:r>
               <a:rPr lang="en-US" dirty="0"/>
-              <a:t>ANTS</a:t>
-            </a:r>
+              <a:t>ANTS – </a:t>
+            </a:r>
+            <a:r>
+              <a:rPr lang="en-US" b="0" i="0" dirty="0">
+                <a:effectLst/>
+                <a:latin typeface="Arial" panose="020B0604020202020204" pitchFamily="34" charset="0"/>
+              </a:rPr>
+              <a:t>Advanced Normalization Tools used to register the images</a:t>
+            </a:r>
+            <a:endParaRPr lang="en-US" dirty="0"/>
           </a:p>
           <a:p>
             <a:r>
               <a:rPr lang="en-US" dirty="0"/>
-              <a:t>NILEARN</a:t>
+              <a:t>NILEARN – Library for analysis of MRI data</a:t>
+            </a:r>
+          </a:p>
+          <a:p>
+            <a:pPr marL="0" indent="0">
+              <a:buNone/>
+            </a:pPr>
+            <a:r>
+              <a:rPr lang="en-US" u="sng" dirty="0"/>
+              <a:t>General Libraries</a:t>
             </a:r>
           </a:p>
           <a:p>
             <a:r>
               <a:rPr lang="en-US" dirty="0"/>
-              <a:t>PANDAS</a:t>
+              <a:t>PANDAS – Data Handling</a:t>
+            </a:r>
+            <a:endParaRPr lang="en-US" dirty="0">
+              <a:solidFill>
+                <a:srgbClr val="D4D4D4"/>
+              </a:solidFill>
+              <a:latin typeface="Menlo" panose="020B0609030804020204" pitchFamily="49" charset="0"/>
+            </a:endParaRPr>
+          </a:p>
+          <a:p>
+            <a:r>
+              <a:rPr lang="en-US" dirty="0"/>
+              <a:t>SKLEARN – Machine Learning</a:t>
+            </a:r>
+          </a:p>
+          <a:p>
+            <a:r>
+              <a:rPr lang="en-US" dirty="0"/>
+              <a:t>Matplotlib/Seaborn – Data visualizations</a:t>
             </a:r>
           </a:p>
         </p:txBody>

</xml_diff>